<commit_message>
add thank you slide to PPT
</commit_message>
<xml_diff>
--- a/TradePres_v1.pptx
+++ b/TradePres_v1.pptx
@@ -5,7 +5,7 @@
     <p:sldMasterId id="2147483660" r:id="rId1"/>
   </p:sldMasterIdLst>
   <p:notesMasterIdLst>
-    <p:notesMasterId r:id="rId14"/>
+    <p:notesMasterId r:id="rId17"/>
   </p:notesMasterIdLst>
   <p:sldIdLst>
     <p:sldId id="256" r:id="rId2"/>
@@ -20,21 +20,24 @@
     <p:sldId id="265" r:id="rId11"/>
     <p:sldId id="266" r:id="rId12"/>
     <p:sldId id="267" r:id="rId13"/>
+    <p:sldId id="268" r:id="rId14"/>
+    <p:sldId id="269" r:id="rId15"/>
+    <p:sldId id="270" r:id="rId16"/>
   </p:sldIdLst>
   <p:sldSz cx="12192000" cy="6858000"/>
   <p:notesSz cx="6858000" cy="9144000"/>
   <p:embeddedFontLst>
     <p:embeddedFont>
       <p:font typeface="Roboto Slab" pitchFamily="2" charset="0"/>
-      <p:regular r:id="rId15"/>
-      <p:bold r:id="rId16"/>
+      <p:regular r:id="rId18"/>
+      <p:bold r:id="rId19"/>
     </p:embeddedFont>
     <p:embeddedFont>
       <p:font typeface="Roboto" panose="02000000000000000000" pitchFamily="2" charset="0"/>
-      <p:regular r:id="rId17"/>
-      <p:bold r:id="rId18"/>
-      <p:italic r:id="rId19"/>
-      <p:boldItalic r:id="rId20"/>
+      <p:regular r:id="rId20"/>
+      <p:bold r:id="rId21"/>
+      <p:italic r:id="rId22"/>
+      <p:boldItalic r:id="rId23"/>
     </p:embeddedFont>
   </p:embeddedFontLst>
   <p:defaultTextStyle>
@@ -821,7 +824,7 @@
   <p:cSld>
     <p:spTree>
       <p:nvGrpSpPr>
-        <p:cNvPr id="1" name="Shape 118"/>
+        <p:cNvPr id="1" name="Shape 120"/>
         <p:cNvGrpSpPr/>
         <p:nvPr/>
       </p:nvGrpSpPr>
@@ -835,7 +838,7 @@
       </p:grpSpPr>
       <p:sp>
         <p:nvSpPr>
-          <p:cNvPr id="119" name="Shape 119"/>
+          <p:cNvPr id="121" name="Shape 121"/>
           <p:cNvSpPr>
             <a:spLocks noGrp="1" noRot="1" noChangeAspect="1"/>
           </p:cNvSpPr>
@@ -876,7 +879,7 @@
       </p:sp>
       <p:sp>
         <p:nvSpPr>
-          <p:cNvPr id="120" name="Shape 120"/>
+          <p:cNvPr id="122" name="Shape 122"/>
           <p:cNvSpPr txBox="1">
             <a:spLocks noGrp="1"/>
           </p:cNvSpPr>
@@ -899,7 +902,7 @@
           </a:bodyPr>
           <a:lstStyle/>
           <a:p>
-            <a:pPr marL="0" lvl="0" indent="0">
+            <a:pPr marL="0" lvl="0" indent="0" rtl="0">
               <a:spcBef>
                 <a:spcPts val="0"/>
               </a:spcBef>
@@ -940,6 +943,214 @@
       <p:sp>
         <p:nvSpPr>
           <p:cNvPr id="126" name="Shape 126"/>
+          <p:cNvSpPr>
+            <a:spLocks noGrp="1" noRot="1" noChangeAspect="1"/>
+          </p:cNvSpPr>
+          <p:nvPr>
+            <p:ph type="sldImg" idx="2"/>
+          </p:nvPr>
+        </p:nvSpPr>
+        <p:spPr>
+          <a:xfrm>
+            <a:off x="1143225" y="685800"/>
+            <a:ext cx="4572300" cy="3429000"/>
+          </a:xfrm>
+          <a:custGeom>
+            <a:avLst/>
+            <a:gdLst/>
+            <a:ahLst/>
+            <a:cxnLst/>
+            <a:rect l="0" t="0" r="0" b="0"/>
+            <a:pathLst>
+              <a:path w="120000" h="120000" extrusionOk="0">
+                <a:moveTo>
+                  <a:pt x="0" y="0"/>
+                </a:moveTo>
+                <a:lnTo>
+                  <a:pt x="120000" y="0"/>
+                </a:lnTo>
+                <a:lnTo>
+                  <a:pt x="120000" y="120000"/>
+                </a:lnTo>
+                <a:lnTo>
+                  <a:pt x="0" y="120000"/>
+                </a:lnTo>
+                <a:close/>
+              </a:path>
+            </a:pathLst>
+          </a:custGeom>
+        </p:spPr>
+      </p:sp>
+      <p:sp>
+        <p:nvSpPr>
+          <p:cNvPr id="127" name="Shape 127"/>
+          <p:cNvSpPr txBox="1">
+            <a:spLocks noGrp="1"/>
+          </p:cNvSpPr>
+          <p:nvPr>
+            <p:ph type="body" idx="1"/>
+          </p:nvPr>
+        </p:nvSpPr>
+        <p:spPr>
+          <a:xfrm>
+            <a:off x="685800" y="4343400"/>
+            <a:ext cx="5486400" cy="4114800"/>
+          </a:xfrm>
+          <a:prstGeom prst="rect">
+            <a:avLst/>
+          </a:prstGeom>
+        </p:spPr>
+        <p:txBody>
+          <a:bodyPr spcFirstLastPara="1" wrap="square" lIns="91425" tIns="91425" rIns="91425" bIns="91425" anchor="t" anchorCtr="0">
+            <a:noAutofit/>
+          </a:bodyPr>
+          <a:lstStyle/>
+          <a:p>
+            <a:pPr marL="0" lvl="0" indent="0">
+              <a:spcBef>
+                <a:spcPts val="0"/>
+              </a:spcBef>
+              <a:spcAft>
+                <a:spcPts val="0"/>
+              </a:spcAft>
+              <a:buNone/>
+            </a:pPr>
+            <a:endParaRPr/>
+          </a:p>
+        </p:txBody>
+      </p:sp>
+    </p:spTree>
+  </p:cSld>
+  <p:clrMapOvr>
+    <a:masterClrMapping/>
+  </p:clrMapOvr>
+</p:notes>
+</file>
+
+<file path=ppt/notesSlides/notesSlide12.xml><?xml version="1.0" encoding="utf-8"?>
+<p:notes xmlns:a="http://schemas.openxmlformats.org/drawingml/2006/main" xmlns:r="http://schemas.openxmlformats.org/officeDocument/2006/relationships" xmlns:p="http://schemas.openxmlformats.org/presentationml/2006/main" showMasterSp="0" showMasterPhAnim="0">
+  <p:cSld>
+    <p:spTree>
+      <p:nvGrpSpPr>
+        <p:cNvPr id="1" name="Shape 132"/>
+        <p:cNvGrpSpPr/>
+        <p:nvPr/>
+      </p:nvGrpSpPr>
+      <p:grpSpPr>
+        <a:xfrm>
+          <a:off x="0" y="0"/>
+          <a:ext cx="0" cy="0"/>
+          <a:chOff x="0" y="0"/>
+          <a:chExt cx="0" cy="0"/>
+        </a:xfrm>
+      </p:grpSpPr>
+      <p:sp>
+        <p:nvSpPr>
+          <p:cNvPr id="133" name="Shape 133"/>
+          <p:cNvSpPr>
+            <a:spLocks noGrp="1" noRot="1" noChangeAspect="1"/>
+          </p:cNvSpPr>
+          <p:nvPr>
+            <p:ph type="sldImg" idx="2"/>
+          </p:nvPr>
+        </p:nvSpPr>
+        <p:spPr>
+          <a:xfrm>
+            <a:off x="1143225" y="685800"/>
+            <a:ext cx="4572300" cy="3429000"/>
+          </a:xfrm>
+          <a:custGeom>
+            <a:avLst/>
+            <a:gdLst/>
+            <a:ahLst/>
+            <a:cxnLst/>
+            <a:rect l="0" t="0" r="0" b="0"/>
+            <a:pathLst>
+              <a:path w="120000" h="120000" extrusionOk="0">
+                <a:moveTo>
+                  <a:pt x="0" y="0"/>
+                </a:moveTo>
+                <a:lnTo>
+                  <a:pt x="120000" y="0"/>
+                </a:lnTo>
+                <a:lnTo>
+                  <a:pt x="120000" y="120000"/>
+                </a:lnTo>
+                <a:lnTo>
+                  <a:pt x="0" y="120000"/>
+                </a:lnTo>
+                <a:close/>
+              </a:path>
+            </a:pathLst>
+          </a:custGeom>
+        </p:spPr>
+      </p:sp>
+      <p:sp>
+        <p:nvSpPr>
+          <p:cNvPr id="134" name="Shape 134"/>
+          <p:cNvSpPr txBox="1">
+            <a:spLocks noGrp="1"/>
+          </p:cNvSpPr>
+          <p:nvPr>
+            <p:ph type="body" idx="1"/>
+          </p:nvPr>
+        </p:nvSpPr>
+        <p:spPr>
+          <a:xfrm>
+            <a:off x="685800" y="4343400"/>
+            <a:ext cx="5486400" cy="4114800"/>
+          </a:xfrm>
+          <a:prstGeom prst="rect">
+            <a:avLst/>
+          </a:prstGeom>
+        </p:spPr>
+        <p:txBody>
+          <a:bodyPr spcFirstLastPara="1" wrap="square" lIns="91425" tIns="91425" rIns="91425" bIns="91425" anchor="t" anchorCtr="0">
+            <a:noAutofit/>
+          </a:bodyPr>
+          <a:lstStyle/>
+          <a:p>
+            <a:pPr marL="0" lvl="0" indent="0">
+              <a:spcBef>
+                <a:spcPts val="0"/>
+              </a:spcBef>
+              <a:spcAft>
+                <a:spcPts val="0"/>
+              </a:spcAft>
+              <a:buNone/>
+            </a:pPr>
+            <a:endParaRPr/>
+          </a:p>
+        </p:txBody>
+      </p:sp>
+    </p:spTree>
+  </p:cSld>
+  <p:clrMapOvr>
+    <a:masterClrMapping/>
+  </p:clrMapOvr>
+</p:notes>
+</file>
+
+<file path=ppt/notesSlides/notesSlide13.xml><?xml version="1.0" encoding="utf-8"?>
+<p:notes xmlns:a="http://schemas.openxmlformats.org/drawingml/2006/main" xmlns:r="http://schemas.openxmlformats.org/officeDocument/2006/relationships" xmlns:p="http://schemas.openxmlformats.org/presentationml/2006/main" showMasterSp="0" showMasterPhAnim="0">
+  <p:cSld>
+    <p:spTree>
+      <p:nvGrpSpPr>
+        <p:cNvPr id="1" name="Shape 139"/>
+        <p:cNvGrpSpPr/>
+        <p:nvPr/>
+      </p:nvGrpSpPr>
+      <p:grpSpPr>
+        <a:xfrm>
+          <a:off x="0" y="0"/>
+          <a:ext cx="0" cy="0"/>
+          <a:chOff x="0" y="0"/>
+          <a:chExt cx="0" cy="0"/>
+        </a:xfrm>
+      </p:grpSpPr>
+      <p:sp>
+        <p:nvSpPr>
+          <p:cNvPr id="140" name="Shape 140"/>
           <p:cNvSpPr txBox="1">
             <a:spLocks noGrp="1"/>
           </p:cNvSpPr>
@@ -981,7 +1192,7 @@
       </p:sp>
       <p:sp>
         <p:nvSpPr>
-          <p:cNvPr id="127" name="Shape 127"/>
+          <p:cNvPr id="141" name="Shape 141"/>
           <p:cNvSpPr>
             <a:spLocks noGrp="1" noRot="1" noChangeAspect="1"/>
           </p:cNvSpPr>
@@ -1028,12 +1239,12 @@
 </p:notes>
 </file>
 
-<file path=ppt/notesSlides/notesSlide12.xml><?xml version="1.0" encoding="utf-8"?>
+<file path=ppt/notesSlides/notesSlide14.xml><?xml version="1.0" encoding="utf-8"?>
 <p:notes xmlns:a="http://schemas.openxmlformats.org/drawingml/2006/main" xmlns:r="http://schemas.openxmlformats.org/officeDocument/2006/relationships" xmlns:p="http://schemas.openxmlformats.org/presentationml/2006/main" showMasterSp="0" showMasterPhAnim="0">
   <p:cSld>
     <p:spTree>
       <p:nvGrpSpPr>
-        <p:cNvPr id="1" name="Shape 131"/>
+        <p:cNvPr id="1" name="Shape 145"/>
         <p:cNvGrpSpPr/>
         <p:nvPr/>
       </p:nvGrpSpPr>
@@ -1047,7 +1258,7 @@
       </p:grpSpPr>
       <p:sp>
         <p:nvSpPr>
-          <p:cNvPr id="132" name="Shape 132"/>
+          <p:cNvPr id="146" name="Shape 146"/>
           <p:cNvSpPr txBox="1">
             <a:spLocks noGrp="1"/>
           </p:cNvSpPr>
@@ -1089,7 +1300,7 @@
       </p:sp>
       <p:sp>
         <p:nvSpPr>
-          <p:cNvPr id="133" name="Shape 133"/>
+          <p:cNvPr id="147" name="Shape 147"/>
           <p:cNvSpPr>
             <a:spLocks noGrp="1" noRot="1" noChangeAspect="1"/>
           </p:cNvSpPr>
@@ -1127,6 +1338,110 @@
             </a:pathLst>
           </a:custGeom>
         </p:spPr>
+      </p:sp>
+    </p:spTree>
+  </p:cSld>
+  <p:clrMapOvr>
+    <a:masterClrMapping/>
+  </p:clrMapOvr>
+</p:notes>
+</file>
+
+<file path=ppt/notesSlides/notesSlide15.xml><?xml version="1.0" encoding="utf-8"?>
+<p:notes xmlns:a="http://schemas.openxmlformats.org/drawingml/2006/main" xmlns:r="http://schemas.openxmlformats.org/officeDocument/2006/relationships" xmlns:p="http://schemas.openxmlformats.org/presentationml/2006/main" showMasterSp="0" showMasterPhAnim="0">
+  <p:cSld>
+    <p:spTree>
+      <p:nvGrpSpPr>
+        <p:cNvPr id="1" name="Shape 151"/>
+        <p:cNvGrpSpPr/>
+        <p:nvPr/>
+      </p:nvGrpSpPr>
+      <p:grpSpPr>
+        <a:xfrm>
+          <a:off x="0" y="0"/>
+          <a:ext cx="0" cy="0"/>
+          <a:chOff x="0" y="0"/>
+          <a:chExt cx="0" cy="0"/>
+        </a:xfrm>
+      </p:grpSpPr>
+      <p:sp>
+        <p:nvSpPr>
+          <p:cNvPr id="152" name="Shape 152"/>
+          <p:cNvSpPr>
+            <a:spLocks noGrp="1" noRot="1" noChangeAspect="1"/>
+          </p:cNvSpPr>
+          <p:nvPr>
+            <p:ph type="sldImg" idx="2"/>
+          </p:nvPr>
+        </p:nvSpPr>
+        <p:spPr>
+          <a:xfrm>
+            <a:off x="1143225" y="685800"/>
+            <a:ext cx="4572300" cy="3429000"/>
+          </a:xfrm>
+          <a:custGeom>
+            <a:avLst/>
+            <a:gdLst/>
+            <a:ahLst/>
+            <a:cxnLst/>
+            <a:rect l="0" t="0" r="0" b="0"/>
+            <a:pathLst>
+              <a:path w="120000" h="120000" extrusionOk="0">
+                <a:moveTo>
+                  <a:pt x="0" y="0"/>
+                </a:moveTo>
+                <a:lnTo>
+                  <a:pt x="120000" y="0"/>
+                </a:lnTo>
+                <a:lnTo>
+                  <a:pt x="120000" y="120000"/>
+                </a:lnTo>
+                <a:lnTo>
+                  <a:pt x="0" y="120000"/>
+                </a:lnTo>
+                <a:close/>
+              </a:path>
+            </a:pathLst>
+          </a:custGeom>
+        </p:spPr>
+      </p:sp>
+      <p:sp>
+        <p:nvSpPr>
+          <p:cNvPr id="153" name="Shape 153"/>
+          <p:cNvSpPr txBox="1">
+            <a:spLocks noGrp="1"/>
+          </p:cNvSpPr>
+          <p:nvPr>
+            <p:ph type="body" idx="1"/>
+          </p:nvPr>
+        </p:nvSpPr>
+        <p:spPr>
+          <a:xfrm>
+            <a:off x="685800" y="4343400"/>
+            <a:ext cx="5486400" cy="4114800"/>
+          </a:xfrm>
+          <a:prstGeom prst="rect">
+            <a:avLst/>
+          </a:prstGeom>
+        </p:spPr>
+        <p:txBody>
+          <a:bodyPr spcFirstLastPara="1" wrap="square" lIns="91425" tIns="91425" rIns="91425" bIns="91425" anchor="t" anchorCtr="0">
+            <a:noAutofit/>
+          </a:bodyPr>
+          <a:lstStyle/>
+          <a:p>
+            <a:pPr marL="0" lvl="0" indent="0">
+              <a:spcBef>
+                <a:spcPts val="0"/>
+              </a:spcBef>
+              <a:spcAft>
+                <a:spcPts val="0"/>
+              </a:spcAft>
+              <a:buNone/>
+            </a:pPr>
+            <a:endParaRPr/>
+          </a:p>
+        </p:txBody>
       </p:sp>
     </p:spTree>
   </p:cSld>
@@ -1855,7 +2170,7 @@
           </a:bodyPr>
           <a:lstStyle/>
           <a:p>
-            <a:pPr marL="0" lvl="0" indent="0" rtl="0">
+            <a:pPr marL="0" lvl="0" indent="0">
               <a:spcBef>
                 <a:spcPts val="0"/>
               </a:spcBef>
@@ -1881,7 +2196,7 @@
   <p:cSld>
     <p:spTree>
       <p:nvGrpSpPr>
-        <p:cNvPr id="1" name="Shape 111"/>
+        <p:cNvPr id="1" name="Shape 113"/>
         <p:cNvGrpSpPr/>
         <p:nvPr/>
       </p:nvGrpSpPr>
@@ -1895,7 +2210,7 @@
       </p:grpSpPr>
       <p:sp>
         <p:nvSpPr>
-          <p:cNvPr id="112" name="Shape 112"/>
+          <p:cNvPr id="114" name="Shape 114"/>
           <p:cNvSpPr>
             <a:spLocks noGrp="1" noRot="1" noChangeAspect="1"/>
           </p:cNvSpPr>
@@ -1936,7 +2251,7 @@
       </p:sp>
       <p:sp>
         <p:nvSpPr>
-          <p:cNvPr id="113" name="Shape 113"/>
+          <p:cNvPr id="115" name="Shape 115"/>
           <p:cNvSpPr txBox="1">
             <a:spLocks noGrp="1"/>
           </p:cNvSpPr>
@@ -8517,7 +8832,7 @@
   <p:cSld>
     <p:spTree>
       <p:nvGrpSpPr>
-        <p:cNvPr id="1" name="Shape 121"/>
+        <p:cNvPr id="1" name="Shape 123"/>
         <p:cNvGrpSpPr/>
         <p:nvPr/>
       </p:nvGrpSpPr>
@@ -8531,32 +8846,32 @@
       </p:grpSpPr>
       <p:sp>
         <p:nvSpPr>
-          <p:cNvPr id="122" name="Shape 122"/>
+          <p:cNvPr id="124" name="Shape 124"/>
           <p:cNvSpPr txBox="1">
             <a:spLocks noGrp="1"/>
           </p:cNvSpPr>
           <p:nvPr>
-            <p:ph type="body" idx="1"/>
+            <p:ph type="title"/>
           </p:nvPr>
         </p:nvSpPr>
         <p:spPr>
           <a:xfrm>
-            <a:off x="566725" y="180725"/>
-            <a:ext cx="10787100" cy="5996100"/>
+            <a:off x="641000" y="2353267"/>
+            <a:ext cx="10962900" cy="1209900"/>
           </a:xfrm>
           <a:prstGeom prst="rect">
             <a:avLst/>
           </a:prstGeom>
         </p:spPr>
         <p:txBody>
-          <a:bodyPr spcFirstLastPara="1" wrap="square" lIns="121900" tIns="121900" rIns="121900" bIns="121900" anchor="t" anchorCtr="0">
+          <a:bodyPr spcFirstLastPara="1" wrap="square" lIns="121900" tIns="121900" rIns="121900" bIns="121900" anchor="b" anchorCtr="0">
             <a:noAutofit/>
           </a:bodyPr>
           <a:lstStyle/>
           <a:p>
-            <a:pPr marL="0" lvl="0" indent="0">
-              <a:spcBef>
-                <a:spcPts val="1000"/>
+            <a:pPr marL="0" lvl="0" indent="0" rtl="0">
+              <a:spcBef>
+                <a:spcPts val="0"/>
               </a:spcBef>
               <a:spcAft>
                 <a:spcPts val="0"/>
@@ -8564,147 +8879,13 @@
               <a:buNone/>
             </a:pPr>
             <a:r>
-              <a:rPr lang="en-US" sz="3000" u="sng">
-                <a:latin typeface="Calibri"/>
-                <a:ea typeface="Calibri"/>
-                <a:cs typeface="Calibri"/>
-                <a:sym typeface="Calibri"/>
-              </a:rPr>
-              <a:t>Apply VADER Sentiment Analysis: </a:t>
+              <a:rPr lang="en-US"/>
+              <a:t>Public Sentiment</a:t>
             </a:r>
-            <a:endParaRPr sz="3000" u="sng">
-              <a:latin typeface="Calibri"/>
-              <a:ea typeface="Calibri"/>
-              <a:cs typeface="Calibri"/>
-              <a:sym typeface="Calibri"/>
-            </a:endParaRPr>
-          </a:p>
-          <a:p>
-            <a:pPr marL="0" lvl="0" indent="0">
-              <a:spcBef>
-                <a:spcPts val="2100"/>
-              </a:spcBef>
-              <a:spcAft>
-                <a:spcPts val="0"/>
-              </a:spcAft>
-              <a:buNone/>
-            </a:pPr>
-            <a:endParaRPr sz="3000" u="sng">
-              <a:latin typeface="Calibri"/>
-              <a:ea typeface="Calibri"/>
-              <a:cs typeface="Calibri"/>
-              <a:sym typeface="Calibri"/>
-            </a:endParaRPr>
-          </a:p>
-          <a:p>
-            <a:pPr marL="0" lvl="0" indent="0" rtl="0">
-              <a:spcBef>
-                <a:spcPts val="2100"/>
-              </a:spcBef>
-              <a:spcAft>
-                <a:spcPts val="0"/>
-              </a:spcAft>
-              <a:buNone/>
-            </a:pPr>
-            <a:endParaRPr sz="3000" u="sng">
-              <a:latin typeface="Calibri"/>
-              <a:ea typeface="Calibri"/>
-              <a:cs typeface="Calibri"/>
-              <a:sym typeface="Calibri"/>
-            </a:endParaRPr>
-          </a:p>
-          <a:p>
-            <a:pPr marL="0" lvl="0" indent="0" rtl="0">
-              <a:spcBef>
-                <a:spcPts val="2100"/>
-              </a:spcBef>
-              <a:spcAft>
-                <a:spcPts val="2100"/>
-              </a:spcAft>
-              <a:buNone/>
-            </a:pPr>
-            <a:br>
-              <a:rPr lang="en-US" sz="1050" b="1">
-                <a:latin typeface="Verdana"/>
-                <a:ea typeface="Verdana"/>
-                <a:cs typeface="Verdana"/>
-                <a:sym typeface="Verdana"/>
-              </a:rPr>
-            </a:br>
-            <a:r>
-              <a:rPr lang="en-US" sz="1050" b="1">
-                <a:latin typeface="Verdana"/>
-                <a:ea typeface="Verdana"/>
-                <a:cs typeface="Verdana"/>
-                <a:sym typeface="Verdana"/>
-              </a:rPr>
-              <a:t> </a:t>
-            </a:r>
-            <a:endParaRPr sz="1050" b="1">
-              <a:latin typeface="Verdana"/>
-              <a:ea typeface="Verdana"/>
-              <a:cs typeface="Verdana"/>
-              <a:sym typeface="Verdana"/>
-            </a:endParaRPr>
+            <a:endParaRPr/>
           </a:p>
         </p:txBody>
       </p:sp>
-      <p:pic>
-        <p:nvPicPr>
-          <p:cNvPr id="123" name="Shape 123"/>
-          <p:cNvPicPr preferRelativeResize="0"/>
-          <p:nvPr/>
-        </p:nvPicPr>
-        <p:blipFill>
-          <a:blip r:embed="rId3">
-            <a:alphaModFix/>
-          </a:blip>
-          <a:stretch>
-            <a:fillRect/>
-          </a:stretch>
-        </p:blipFill>
-        <p:spPr>
-          <a:xfrm>
-            <a:off x="0" y="1413800"/>
-            <a:ext cx="6625475" cy="4030400"/>
-          </a:xfrm>
-          <a:prstGeom prst="rect">
-            <a:avLst/>
-          </a:prstGeom>
-          <a:noFill/>
-          <a:ln>
-            <a:noFill/>
-          </a:ln>
-        </p:spPr>
-      </p:pic>
-      <p:pic>
-        <p:nvPicPr>
-          <p:cNvPr id="124" name="Shape 124"/>
-          <p:cNvPicPr preferRelativeResize="0"/>
-          <p:nvPr/>
-        </p:nvPicPr>
-        <p:blipFill>
-          <a:blip r:embed="rId4">
-            <a:alphaModFix/>
-          </a:blip>
-          <a:stretch>
-            <a:fillRect/>
-          </a:stretch>
-        </p:blipFill>
-        <p:spPr>
-          <a:xfrm>
-            <a:off x="6174100" y="1413800"/>
-            <a:ext cx="6017900" cy="4030400"/>
-          </a:xfrm>
-          <a:prstGeom prst="rect">
-            <a:avLst/>
-          </a:prstGeom>
-          <a:noFill/>
-          <a:ln>
-            <a:noFill/>
-          </a:ln>
-        </p:spPr>
-      </p:pic>
     </p:spTree>
   </p:cSld>
   <p:clrMapOvr>
@@ -8742,6 +8923,406 @@
         </p:nvSpPr>
         <p:spPr>
           <a:xfrm>
+            <a:off x="838200" y="-140325"/>
+            <a:ext cx="10515600" cy="1325700"/>
+          </a:xfrm>
+          <a:prstGeom prst="rect">
+            <a:avLst/>
+          </a:prstGeom>
+        </p:spPr>
+        <p:txBody>
+          <a:bodyPr spcFirstLastPara="1" wrap="square" lIns="121900" tIns="121900" rIns="121900" bIns="121900" anchor="ctr" anchorCtr="0">
+            <a:noAutofit/>
+          </a:bodyPr>
+          <a:lstStyle/>
+          <a:p>
+            <a:pPr marL="0" lvl="0" indent="0">
+              <a:spcBef>
+                <a:spcPts val="0"/>
+              </a:spcBef>
+              <a:spcAft>
+                <a:spcPts val="0"/>
+              </a:spcAft>
+              <a:buNone/>
+            </a:pPr>
+            <a:r>
+              <a:rPr lang="en-US" u="sng"/>
+              <a:t>VADER Sentiment Analysis of Sample Tweets</a:t>
+            </a:r>
+            <a:endParaRPr u="sng"/>
+          </a:p>
+        </p:txBody>
+      </p:sp>
+      <p:sp>
+        <p:nvSpPr>
+          <p:cNvPr id="130" name="Shape 130"/>
+          <p:cNvSpPr txBox="1">
+            <a:spLocks noGrp="1"/>
+          </p:cNvSpPr>
+          <p:nvPr>
+            <p:ph type="body" idx="1"/>
+          </p:nvPr>
+        </p:nvSpPr>
+        <p:spPr>
+          <a:xfrm>
+            <a:off x="838200" y="753475"/>
+            <a:ext cx="10515600" cy="4351200"/>
+          </a:xfrm>
+          <a:prstGeom prst="rect">
+            <a:avLst/>
+          </a:prstGeom>
+        </p:spPr>
+        <p:txBody>
+          <a:bodyPr spcFirstLastPara="1" wrap="square" lIns="121900" tIns="121900" rIns="121900" bIns="121900" anchor="t" anchorCtr="0">
+            <a:noAutofit/>
+          </a:bodyPr>
+          <a:lstStyle/>
+          <a:p>
+            <a:pPr marL="457200" lvl="0" indent="-406400" rtl="0">
+              <a:spcBef>
+                <a:spcPts val="1000"/>
+              </a:spcBef>
+              <a:spcAft>
+                <a:spcPts val="0"/>
+              </a:spcAft>
+              <a:buSzPts val="2800"/>
+              <a:buFont typeface="Calibri"/>
+              <a:buChar char="-"/>
+            </a:pPr>
+            <a:r>
+              <a:rPr lang="en-US">
+                <a:latin typeface="Calibri"/>
+                <a:ea typeface="Calibri"/>
+                <a:cs typeface="Calibri"/>
+                <a:sym typeface="Calibri"/>
+              </a:rPr>
+              <a:t>Imported 9,757 tweets to analyze through VADER text sentiment analysis. </a:t>
+            </a:r>
+            <a:endParaRPr>
+              <a:latin typeface="Calibri"/>
+              <a:ea typeface="Calibri"/>
+              <a:cs typeface="Calibri"/>
+              <a:sym typeface="Calibri"/>
+            </a:endParaRPr>
+          </a:p>
+          <a:p>
+            <a:pPr marL="457200" lvl="0" indent="-406400" rtl="0">
+              <a:spcBef>
+                <a:spcPts val="0"/>
+              </a:spcBef>
+              <a:spcAft>
+                <a:spcPts val="0"/>
+              </a:spcAft>
+              <a:buSzPts val="2800"/>
+              <a:buFont typeface="Calibri"/>
+              <a:buChar char="-"/>
+            </a:pPr>
+            <a:r>
+              <a:rPr lang="en-US">
+                <a:latin typeface="Calibri"/>
+                <a:ea typeface="Calibri"/>
+                <a:cs typeface="Calibri"/>
+                <a:sym typeface="Calibri"/>
+              </a:rPr>
+              <a:t>Distinguished between tweets and retweets (5,360 are tweets, 4,397 are retweets)</a:t>
+            </a:r>
+            <a:endParaRPr>
+              <a:latin typeface="Calibri"/>
+              <a:ea typeface="Calibri"/>
+              <a:cs typeface="Calibri"/>
+              <a:sym typeface="Calibri"/>
+            </a:endParaRPr>
+          </a:p>
+          <a:p>
+            <a:pPr marL="457200" lvl="0" indent="-406400" rtl="0">
+              <a:spcBef>
+                <a:spcPts val="0"/>
+              </a:spcBef>
+              <a:spcAft>
+                <a:spcPts val="0"/>
+              </a:spcAft>
+              <a:buSzPts val="2800"/>
+              <a:buChar char="-"/>
+            </a:pPr>
+            <a:r>
+              <a:rPr lang="en-US">
+                <a:latin typeface="Calibri"/>
+                <a:ea typeface="Calibri"/>
+                <a:cs typeface="Calibri"/>
+                <a:sym typeface="Calibri"/>
+              </a:rPr>
+              <a:t>Categorize posts by polarity (2555 Positive - 7202 Negative)</a:t>
+            </a:r>
+            <a:endParaRPr/>
+          </a:p>
+        </p:txBody>
+      </p:sp>
+      <p:pic>
+        <p:nvPicPr>
+          <p:cNvPr id="131" name="Shape 131"/>
+          <p:cNvPicPr preferRelativeResize="0"/>
+          <p:nvPr/>
+        </p:nvPicPr>
+        <p:blipFill>
+          <a:blip r:embed="rId3">
+            <a:alphaModFix/>
+          </a:blip>
+          <a:stretch>
+            <a:fillRect/>
+          </a:stretch>
+        </p:blipFill>
+        <p:spPr>
+          <a:xfrm>
+            <a:off x="903675" y="3106200"/>
+            <a:ext cx="10645024" cy="3568775"/>
+          </a:xfrm>
+          <a:prstGeom prst="rect">
+            <a:avLst/>
+          </a:prstGeom>
+          <a:noFill/>
+          <a:ln>
+            <a:noFill/>
+          </a:ln>
+        </p:spPr>
+      </p:pic>
+    </p:spTree>
+  </p:cSld>
+  <p:clrMapOvr>
+    <a:masterClrMapping/>
+  </p:clrMapOvr>
+</p:sld>
+</file>
+
+<file path=ppt/slides/slide12.xml><?xml version="1.0" encoding="utf-8"?>
+<p:sld xmlns:a="http://schemas.openxmlformats.org/drawingml/2006/main" xmlns:r="http://schemas.openxmlformats.org/officeDocument/2006/relationships" xmlns:p="http://schemas.openxmlformats.org/presentationml/2006/main">
+  <p:cSld>
+    <p:spTree>
+      <p:nvGrpSpPr>
+        <p:cNvPr id="1" name="Shape 135"/>
+        <p:cNvGrpSpPr/>
+        <p:nvPr/>
+      </p:nvGrpSpPr>
+      <p:grpSpPr>
+        <a:xfrm>
+          <a:off x="0" y="0"/>
+          <a:ext cx="0" cy="0"/>
+          <a:chOff x="0" y="0"/>
+          <a:chExt cx="0" cy="0"/>
+        </a:xfrm>
+      </p:grpSpPr>
+      <p:sp>
+        <p:nvSpPr>
+          <p:cNvPr id="136" name="Shape 136"/>
+          <p:cNvSpPr txBox="1">
+            <a:spLocks noGrp="1"/>
+          </p:cNvSpPr>
+          <p:nvPr>
+            <p:ph type="body" idx="1"/>
+          </p:nvPr>
+        </p:nvSpPr>
+        <p:spPr>
+          <a:xfrm>
+            <a:off x="566725" y="180725"/>
+            <a:ext cx="10787100" cy="5996100"/>
+          </a:xfrm>
+          <a:prstGeom prst="rect">
+            <a:avLst/>
+          </a:prstGeom>
+        </p:spPr>
+        <p:txBody>
+          <a:bodyPr spcFirstLastPara="1" wrap="square" lIns="121900" tIns="121900" rIns="121900" bIns="121900" anchor="t" anchorCtr="0">
+            <a:noAutofit/>
+          </a:bodyPr>
+          <a:lstStyle/>
+          <a:p>
+            <a:pPr marL="0" lvl="0" indent="0">
+              <a:spcBef>
+                <a:spcPts val="1000"/>
+              </a:spcBef>
+              <a:spcAft>
+                <a:spcPts val="0"/>
+              </a:spcAft>
+              <a:buNone/>
+            </a:pPr>
+            <a:r>
+              <a:rPr lang="en-US" sz="3000" u="sng">
+                <a:latin typeface="Calibri"/>
+                <a:ea typeface="Calibri"/>
+                <a:cs typeface="Calibri"/>
+                <a:sym typeface="Calibri"/>
+              </a:rPr>
+              <a:t>Apply VADER Sentiment Analysis: </a:t>
+            </a:r>
+            <a:endParaRPr sz="3000" u="sng">
+              <a:latin typeface="Calibri"/>
+              <a:ea typeface="Calibri"/>
+              <a:cs typeface="Calibri"/>
+              <a:sym typeface="Calibri"/>
+            </a:endParaRPr>
+          </a:p>
+          <a:p>
+            <a:pPr marL="0" lvl="0" indent="0">
+              <a:spcBef>
+                <a:spcPts val="2100"/>
+              </a:spcBef>
+              <a:spcAft>
+                <a:spcPts val="0"/>
+              </a:spcAft>
+              <a:buNone/>
+            </a:pPr>
+            <a:endParaRPr sz="3000" u="sng">
+              <a:latin typeface="Calibri"/>
+              <a:ea typeface="Calibri"/>
+              <a:cs typeface="Calibri"/>
+              <a:sym typeface="Calibri"/>
+            </a:endParaRPr>
+          </a:p>
+          <a:p>
+            <a:pPr marL="0" lvl="0" indent="0" rtl="0">
+              <a:spcBef>
+                <a:spcPts val="2100"/>
+              </a:spcBef>
+              <a:spcAft>
+                <a:spcPts val="0"/>
+              </a:spcAft>
+              <a:buNone/>
+            </a:pPr>
+            <a:endParaRPr sz="3000" u="sng">
+              <a:latin typeface="Calibri"/>
+              <a:ea typeface="Calibri"/>
+              <a:cs typeface="Calibri"/>
+              <a:sym typeface="Calibri"/>
+            </a:endParaRPr>
+          </a:p>
+          <a:p>
+            <a:pPr marL="0" lvl="0" indent="0" rtl="0">
+              <a:spcBef>
+                <a:spcPts val="2100"/>
+              </a:spcBef>
+              <a:spcAft>
+                <a:spcPts val="2100"/>
+              </a:spcAft>
+              <a:buNone/>
+            </a:pPr>
+            <a:br>
+              <a:rPr lang="en-US" sz="1050" b="1">
+                <a:latin typeface="Verdana"/>
+                <a:ea typeface="Verdana"/>
+                <a:cs typeface="Verdana"/>
+                <a:sym typeface="Verdana"/>
+              </a:rPr>
+            </a:br>
+            <a:r>
+              <a:rPr lang="en-US" sz="1050" b="1">
+                <a:latin typeface="Verdana"/>
+                <a:ea typeface="Verdana"/>
+                <a:cs typeface="Verdana"/>
+                <a:sym typeface="Verdana"/>
+              </a:rPr>
+              <a:t> </a:t>
+            </a:r>
+            <a:endParaRPr sz="1050" b="1">
+              <a:latin typeface="Verdana"/>
+              <a:ea typeface="Verdana"/>
+              <a:cs typeface="Verdana"/>
+              <a:sym typeface="Verdana"/>
+            </a:endParaRPr>
+          </a:p>
+        </p:txBody>
+      </p:sp>
+      <p:pic>
+        <p:nvPicPr>
+          <p:cNvPr id="137" name="Shape 137"/>
+          <p:cNvPicPr preferRelativeResize="0"/>
+          <p:nvPr/>
+        </p:nvPicPr>
+        <p:blipFill>
+          <a:blip r:embed="rId3">
+            <a:alphaModFix/>
+          </a:blip>
+          <a:stretch>
+            <a:fillRect/>
+          </a:stretch>
+        </p:blipFill>
+        <p:spPr>
+          <a:xfrm>
+            <a:off x="0" y="1413800"/>
+            <a:ext cx="6625475" cy="4030400"/>
+          </a:xfrm>
+          <a:prstGeom prst="rect">
+            <a:avLst/>
+          </a:prstGeom>
+          <a:noFill/>
+          <a:ln>
+            <a:noFill/>
+          </a:ln>
+        </p:spPr>
+      </p:pic>
+      <p:pic>
+        <p:nvPicPr>
+          <p:cNvPr id="138" name="Shape 138"/>
+          <p:cNvPicPr preferRelativeResize="0"/>
+          <p:nvPr/>
+        </p:nvPicPr>
+        <p:blipFill>
+          <a:blip r:embed="rId4">
+            <a:alphaModFix/>
+          </a:blip>
+          <a:stretch>
+            <a:fillRect/>
+          </a:stretch>
+        </p:blipFill>
+        <p:spPr>
+          <a:xfrm>
+            <a:off x="6174100" y="1413800"/>
+            <a:ext cx="6017900" cy="4030400"/>
+          </a:xfrm>
+          <a:prstGeom prst="rect">
+            <a:avLst/>
+          </a:prstGeom>
+          <a:noFill/>
+          <a:ln>
+            <a:noFill/>
+          </a:ln>
+        </p:spPr>
+      </p:pic>
+    </p:spTree>
+  </p:cSld>
+  <p:clrMapOvr>
+    <a:masterClrMapping/>
+  </p:clrMapOvr>
+</p:sld>
+</file>
+
+<file path=ppt/slides/slide13.xml><?xml version="1.0" encoding="utf-8"?>
+<p:sld xmlns:a="http://schemas.openxmlformats.org/drawingml/2006/main" xmlns:r="http://schemas.openxmlformats.org/officeDocument/2006/relationships" xmlns:p="http://schemas.openxmlformats.org/presentationml/2006/main">
+  <p:cSld>
+    <p:spTree>
+      <p:nvGrpSpPr>
+        <p:cNvPr id="1" name="Shape 142"/>
+        <p:cNvGrpSpPr/>
+        <p:nvPr/>
+      </p:nvGrpSpPr>
+      <p:grpSpPr>
+        <a:xfrm>
+          <a:off x="0" y="0"/>
+          <a:ext cx="0" cy="0"/>
+          <a:chOff x="0" y="0"/>
+          <a:chExt cx="0" cy="0"/>
+        </a:xfrm>
+      </p:grpSpPr>
+      <p:sp>
+        <p:nvSpPr>
+          <p:cNvPr id="143" name="Shape 143"/>
+          <p:cNvSpPr txBox="1">
+            <a:spLocks noGrp="1"/>
+          </p:cNvSpPr>
+          <p:nvPr>
+            <p:ph type="title"/>
+          </p:nvPr>
+        </p:nvSpPr>
+        <p:spPr>
+          <a:xfrm>
             <a:off x="838200" y="365125"/>
             <a:ext cx="10515600" cy="1325563"/>
           </a:xfrm>
@@ -8802,7 +9383,7 @@
       </p:sp>
       <p:pic>
         <p:nvPicPr>
-          <p:cNvPr id="130" name="Shape 130"/>
+          <p:cNvPr id="144" name="Shape 144"/>
           <p:cNvPicPr preferRelativeResize="0">
             <a:picLocks noGrp="1"/>
           </p:cNvPicPr>
@@ -8839,12 +9420,12 @@
 </p:sld>
 </file>
 
-<file path=ppt/slides/slide12.xml><?xml version="1.0" encoding="utf-8"?>
+<file path=ppt/slides/slide14.xml><?xml version="1.0" encoding="utf-8"?>
 <p:sld xmlns:a="http://schemas.openxmlformats.org/drawingml/2006/main" xmlns:r="http://schemas.openxmlformats.org/officeDocument/2006/relationships" xmlns:p="http://schemas.openxmlformats.org/presentationml/2006/main">
   <p:cSld>
     <p:spTree>
       <p:nvGrpSpPr>
-        <p:cNvPr id="1" name="Shape 134"/>
+        <p:cNvPr id="1" name="Shape 148"/>
         <p:cNvGrpSpPr/>
         <p:nvPr/>
       </p:nvGrpSpPr>
@@ -8858,7 +9439,7 @@
       </p:grpSpPr>
       <p:sp>
         <p:nvSpPr>
-          <p:cNvPr id="135" name="Shape 135"/>
+          <p:cNvPr id="149" name="Shape 149"/>
           <p:cNvSpPr txBox="1">
             <a:spLocks noGrp="1"/>
           </p:cNvSpPr>
@@ -8928,7 +9509,7 @@
       </p:sp>
       <p:pic>
         <p:nvPicPr>
-          <p:cNvPr id="136" name="Shape 136"/>
+          <p:cNvPr id="150" name="Shape 150"/>
           <p:cNvPicPr preferRelativeResize="0">
             <a:picLocks noGrp="1"/>
           </p:cNvPicPr>
@@ -8957,6 +9538,115 @@
           </a:ln>
         </p:spPr>
       </p:pic>
+    </p:spTree>
+  </p:cSld>
+  <p:clrMapOvr>
+    <a:masterClrMapping/>
+  </p:clrMapOvr>
+</p:sld>
+</file>
+
+<file path=ppt/slides/slide15.xml><?xml version="1.0" encoding="utf-8"?>
+<p:sld xmlns:a="http://schemas.openxmlformats.org/drawingml/2006/main" xmlns:r="http://schemas.openxmlformats.org/officeDocument/2006/relationships" xmlns:p="http://schemas.openxmlformats.org/presentationml/2006/main">
+  <p:cSld>
+    <p:spTree>
+      <p:nvGrpSpPr>
+        <p:cNvPr id="1" name="Shape 154"/>
+        <p:cNvGrpSpPr/>
+        <p:nvPr/>
+      </p:nvGrpSpPr>
+      <p:grpSpPr>
+        <a:xfrm>
+          <a:off x="0" y="0"/>
+          <a:ext cx="0" cy="0"/>
+          <a:chOff x="0" y="0"/>
+          <a:chExt cx="0" cy="0"/>
+        </a:xfrm>
+      </p:grpSpPr>
+      <p:sp>
+        <p:nvSpPr>
+          <p:cNvPr id="155" name="Shape 155"/>
+          <p:cNvSpPr txBox="1">
+            <a:spLocks noGrp="1"/>
+          </p:cNvSpPr>
+          <p:nvPr>
+            <p:ph type="title"/>
+          </p:nvPr>
+        </p:nvSpPr>
+        <p:spPr>
+          <a:xfrm>
+            <a:off x="641000" y="2353267"/>
+            <a:ext cx="10962900" cy="1209900"/>
+          </a:xfrm>
+          <a:prstGeom prst="rect">
+            <a:avLst/>
+          </a:prstGeom>
+        </p:spPr>
+        <p:txBody>
+          <a:bodyPr spcFirstLastPara="1" wrap="square" lIns="121900" tIns="121900" rIns="121900" bIns="121900" anchor="b" anchorCtr="0">
+            <a:noAutofit/>
+          </a:bodyPr>
+          <a:lstStyle/>
+          <a:p>
+            <a:pPr marL="0" lvl="0" indent="0">
+              <a:spcBef>
+                <a:spcPts val="0"/>
+              </a:spcBef>
+              <a:spcAft>
+                <a:spcPts val="0"/>
+              </a:spcAft>
+              <a:buNone/>
+            </a:pPr>
+            <a:r>
+              <a:rPr lang="en-US"/>
+              <a:t>Thank you!</a:t>
+            </a:r>
+            <a:endParaRPr/>
+          </a:p>
+        </p:txBody>
+      </p:sp>
+      <p:sp>
+        <p:nvSpPr>
+          <p:cNvPr id="156" name="Shape 156"/>
+          <p:cNvSpPr txBox="1">
+            <a:spLocks noGrp="1"/>
+          </p:cNvSpPr>
+          <p:nvPr>
+            <p:ph type="subTitle" idx="4294967295"/>
+          </p:nvPr>
+        </p:nvSpPr>
+        <p:spPr>
+          <a:xfrm>
+            <a:off x="2392802" y="4218333"/>
+            <a:ext cx="7711200" cy="1212000"/>
+          </a:xfrm>
+          <a:prstGeom prst="rect">
+            <a:avLst/>
+          </a:prstGeom>
+        </p:spPr>
+        <p:txBody>
+          <a:bodyPr spcFirstLastPara="1" wrap="square" lIns="121900" tIns="121900" rIns="121900" bIns="121900" anchor="t" anchorCtr="0">
+            <a:noAutofit/>
+          </a:bodyPr>
+          <a:lstStyle/>
+          <a:p>
+            <a:pPr marL="0" lvl="0" indent="0" algn="ctr" rtl="0">
+              <a:spcBef>
+                <a:spcPts val="0"/>
+              </a:spcBef>
+              <a:spcAft>
+                <a:spcPts val="2100"/>
+              </a:spcAft>
+              <a:buNone/>
+            </a:pPr>
+            <a:r>
+              <a:rPr lang="en-US"/>
+              <a:t>Questions?</a:t>
+            </a:r>
+            <a:endParaRPr/>
+          </a:p>
+        </p:txBody>
+      </p:sp>
     </p:spTree>
   </p:cSld>
   <p:clrMapOvr>
@@ -9902,8 +10592,8 @@
         </p:blipFill>
         <p:spPr>
           <a:xfrm>
-            <a:off x="493388" y="234250"/>
-            <a:ext cx="11205225" cy="6389501"/>
+            <a:off x="971101" y="0"/>
+            <a:ext cx="10411375" cy="6858002"/>
           </a:xfrm>
           <a:prstGeom prst="rect">
             <a:avLst/>
@@ -9951,20 +10641,20 @@
         </p:nvSpPr>
         <p:spPr>
           <a:xfrm>
-            <a:off x="641000" y="2353267"/>
-            <a:ext cx="10962900" cy="1209900"/>
+            <a:off x="838200" y="365125"/>
+            <a:ext cx="10515600" cy="1325700"/>
           </a:xfrm>
           <a:prstGeom prst="rect">
             <a:avLst/>
           </a:prstGeom>
         </p:spPr>
         <p:txBody>
-          <a:bodyPr spcFirstLastPara="1" wrap="square" lIns="121900" tIns="121900" rIns="121900" bIns="121900" anchor="b" anchorCtr="0">
+          <a:bodyPr spcFirstLastPara="1" wrap="square" lIns="121900" tIns="121900" rIns="121900" bIns="121900" anchor="ctr" anchorCtr="0">
             <a:noAutofit/>
           </a:bodyPr>
           <a:lstStyle/>
           <a:p>
-            <a:pPr marL="0" lvl="0" indent="0" rtl="0">
+            <a:pPr marL="0" lvl="0" indent="0">
               <a:spcBef>
                 <a:spcPts val="0"/>
               </a:spcBef>
@@ -9973,14 +10663,76 @@
               </a:spcAft>
               <a:buNone/>
             </a:pPr>
-            <a:r>
-              <a:rPr lang="en-US"/>
-              <a:t>Public Sentiment</a:t>
-            </a:r>
             <a:endParaRPr/>
           </a:p>
         </p:txBody>
       </p:sp>
+      <p:sp>
+        <p:nvSpPr>
+          <p:cNvPr id="111" name="Shape 111"/>
+          <p:cNvSpPr txBox="1">
+            <a:spLocks noGrp="1"/>
+          </p:cNvSpPr>
+          <p:nvPr>
+            <p:ph type="body" idx="1"/>
+          </p:nvPr>
+        </p:nvSpPr>
+        <p:spPr>
+          <a:xfrm>
+            <a:off x="838200" y="1825625"/>
+            <a:ext cx="10515600" cy="4351200"/>
+          </a:xfrm>
+          <a:prstGeom prst="rect">
+            <a:avLst/>
+          </a:prstGeom>
+        </p:spPr>
+        <p:txBody>
+          <a:bodyPr spcFirstLastPara="1" wrap="square" lIns="121900" tIns="121900" rIns="121900" bIns="121900" anchor="t" anchorCtr="0">
+            <a:noAutofit/>
+          </a:bodyPr>
+          <a:lstStyle/>
+          <a:p>
+            <a:pPr marL="0" lvl="0" indent="0">
+              <a:spcBef>
+                <a:spcPts val="1000"/>
+              </a:spcBef>
+              <a:spcAft>
+                <a:spcPts val="2100"/>
+              </a:spcAft>
+              <a:buNone/>
+            </a:pPr>
+            <a:endParaRPr/>
+          </a:p>
+        </p:txBody>
+      </p:sp>
+      <p:pic>
+        <p:nvPicPr>
+          <p:cNvPr id="112" name="Shape 112"/>
+          <p:cNvPicPr preferRelativeResize="0"/>
+          <p:nvPr/>
+        </p:nvPicPr>
+        <p:blipFill>
+          <a:blip r:embed="rId3">
+            <a:alphaModFix/>
+          </a:blip>
+          <a:stretch>
+            <a:fillRect/>
+          </a:stretch>
+        </p:blipFill>
+        <p:spPr>
+          <a:xfrm>
+            <a:off x="851238" y="-65025"/>
+            <a:ext cx="10489514" cy="6988050"/>
+          </a:xfrm>
+          <a:prstGeom prst="rect">
+            <a:avLst/>
+          </a:prstGeom>
+          <a:noFill/>
+          <a:ln>
+            <a:noFill/>
+          </a:ln>
+        </p:spPr>
+      </p:pic>
     </p:spTree>
   </p:cSld>
   <p:clrMapOvr>
@@ -9994,7 +10746,7 @@
   <p:cSld>
     <p:spTree>
       <p:nvGrpSpPr>
-        <p:cNvPr id="1" name="Shape 114"/>
+        <p:cNvPr id="1" name="Shape 116"/>
         <p:cNvGrpSpPr/>
         <p:nvPr/>
       </p:nvGrpSpPr>
@@ -10008,7 +10760,7 @@
       </p:grpSpPr>
       <p:sp>
         <p:nvSpPr>
-          <p:cNvPr id="115" name="Shape 115"/>
+          <p:cNvPr id="117" name="Shape 117"/>
           <p:cNvSpPr txBox="1">
             <a:spLocks noGrp="1"/>
           </p:cNvSpPr>
@@ -10018,7 +10770,7 @@
         </p:nvSpPr>
         <p:spPr>
           <a:xfrm>
-            <a:off x="838200" y="-140325"/>
+            <a:off x="838200" y="365125"/>
             <a:ext cx="10515600" cy="1325700"/>
           </a:xfrm>
           <a:prstGeom prst="rect">
@@ -10040,17 +10792,13 @@
               </a:spcAft>
               <a:buNone/>
             </a:pPr>
-            <a:r>
-              <a:rPr lang="en-US" u="sng"/>
-              <a:t>VADER Sentiment Analysis of Sample Tweets</a:t>
-            </a:r>
-            <a:endParaRPr u="sng"/>
+            <a:endParaRPr/>
           </a:p>
         </p:txBody>
       </p:sp>
       <p:sp>
         <p:nvSpPr>
-          <p:cNvPr id="116" name="Shape 116"/>
+          <p:cNvPr id="118" name="Shape 118"/>
           <p:cNvSpPr txBox="1">
             <a:spLocks noGrp="1"/>
           </p:cNvSpPr>
@@ -10060,7 +10808,7 @@
         </p:nvSpPr>
         <p:spPr>
           <a:xfrm>
-            <a:off x="838200" y="753475"/>
+            <a:off x="838200" y="1825625"/>
             <a:ext cx="10515600" cy="4351200"/>
           </a:xfrm>
           <a:prstGeom prst="rect">
@@ -10073,92 +10821,22 @@
           </a:bodyPr>
           <a:lstStyle/>
           <a:p>
-            <a:pPr marL="457200" lvl="0" indent="-406400" rtl="0">
+            <a:pPr marL="0" lvl="0" indent="0">
               <a:spcBef>
                 <a:spcPts val="1000"/>
               </a:spcBef>
               <a:spcAft>
-                <a:spcPts val="0"/>
-              </a:spcAft>
-              <a:buSzPts val="2800"/>
-              <a:buFont typeface="Calibri"/>
-              <a:buChar char="-"/>
+                <a:spcPts val="2100"/>
+              </a:spcAft>
+              <a:buNone/>
             </a:pPr>
-            <a:r>
-              <a:rPr lang="en-US">
-                <a:latin typeface="Calibri"/>
-                <a:ea typeface="Calibri"/>
-                <a:cs typeface="Calibri"/>
-                <a:sym typeface="Calibri"/>
-              </a:rPr>
-              <a:t>Imported 9,757 tweets to analyze through VADER text sentiment analysis. </a:t>
-            </a:r>
-            <a:endParaRPr>
-              <a:latin typeface="Calibri"/>
-              <a:ea typeface="Calibri"/>
-              <a:cs typeface="Calibri"/>
-              <a:sym typeface="Calibri"/>
-            </a:endParaRPr>
-          </a:p>
-          <a:p>
-            <a:pPr marL="457200" lvl="0" indent="-406400" rtl="0">
-              <a:spcBef>
-                <a:spcPts val="0"/>
-              </a:spcBef>
-              <a:spcAft>
-                <a:spcPts val="0"/>
-              </a:spcAft>
-              <a:buSzPts val="2800"/>
-              <a:buFont typeface="Calibri"/>
-              <a:buChar char="-"/>
-            </a:pPr>
-            <a:r>
-              <a:rPr lang="en-US">
-                <a:latin typeface="Calibri"/>
-                <a:ea typeface="Calibri"/>
-                <a:cs typeface="Calibri"/>
-                <a:sym typeface="Calibri"/>
-              </a:rPr>
-              <a:t>Distinguished between tweets and retweets (5,360 are tweets, 4,397 are retweets) </a:t>
-            </a:r>
-            <a:endParaRPr>
-              <a:latin typeface="Calibri"/>
-              <a:ea typeface="Calibri"/>
-              <a:cs typeface="Calibri"/>
-              <a:sym typeface="Calibri"/>
-            </a:endParaRPr>
-          </a:p>
-          <a:p>
-            <a:pPr marL="457200" lvl="0" indent="-406400" rtl="0">
-              <a:spcBef>
-                <a:spcPts val="0"/>
-              </a:spcBef>
-              <a:spcAft>
-                <a:spcPts val="0"/>
-              </a:spcAft>
-              <a:buSzPts val="2800"/>
-              <a:buChar char="-"/>
-            </a:pPr>
-            <a:r>
-              <a:rPr lang="en-US">
-                <a:latin typeface="Calibri"/>
-                <a:ea typeface="Calibri"/>
-                <a:cs typeface="Calibri"/>
-                <a:sym typeface="Calibri"/>
-              </a:rPr>
-              <a:t>Categorize posts</a:t>
-            </a:r>
-            <a:r>
-              <a:rPr lang="en-US"/>
-              <a:t> </a:t>
-            </a:r>
             <a:endParaRPr/>
           </a:p>
         </p:txBody>
       </p:sp>
       <p:pic>
         <p:nvPicPr>
-          <p:cNvPr id="117" name="Shape 117"/>
+          <p:cNvPr id="119" name="Shape 119"/>
           <p:cNvPicPr preferRelativeResize="0"/>
           <p:nvPr/>
         </p:nvPicPr>
@@ -10172,8 +10850,8 @@
         </p:blipFill>
         <p:spPr>
           <a:xfrm>
-            <a:off x="903675" y="3106200"/>
-            <a:ext cx="10645024" cy="3568775"/>
+            <a:off x="71425" y="85725"/>
+            <a:ext cx="12049125" cy="6686550"/>
           </a:xfrm>
           <a:prstGeom prst="rect">
             <a:avLst/>

</xml_diff>